<commit_message>
Updated power point for SP4 presentation
</commit_message>
<xml_diff>
--- a/GALAGA REMAKE.pptx
+++ b/GALAGA REMAKE.pptx
@@ -6,6 +6,11 @@
   </p:sldMasterIdLst>
   <p:sldIdLst>
     <p:sldId id="256" r:id="rId2"/>
+    <p:sldId id="257" r:id="rId3"/>
+    <p:sldId id="258" r:id="rId4"/>
+    <p:sldId id="259" r:id="rId5"/>
+    <p:sldId id="260" r:id="rId6"/>
+    <p:sldId id="261" r:id="rId7"/>
   </p:sldIdLst>
   <p:sldSz cx="9144000" cy="6858000" type="screen4x3"/>
   <p:notesSz cx="6858000" cy="9144000"/>
@@ -3137,26 +3142,28 @@
         </p:nvSpPr>
         <p:spPr>
           <a:xfrm>
-            <a:off x="0" y="2204864"/>
+            <a:off x="0" y="2276873"/>
             <a:ext cx="9144000" cy="1296143"/>
           </a:xfrm>
         </p:spPr>
         <p:txBody>
-          <a:bodyPr/>
-          <a:lstStyle/>
-          <a:p>
-            <a:r>
-              <a:rPr lang="en-US" dirty="0" smtClean="0">
+          <a:bodyPr>
+            <a:normAutofit/>
+          </a:bodyPr>
+          <a:lstStyle/>
+          <a:p>
+            <a:r>
+              <a:rPr lang="en-US" sz="4200" dirty="0" smtClean="0">
                 <a:solidFill>
-                  <a:schemeClr val="bg1"/>
+                  <a:srgbClr val="6666FF"/>
                 </a:solidFill>
                 <a:latin typeface="Emulogic" pitchFamily="2" charset="0"/>
               </a:rPr>
-              <a:t>REMAKE</a:t>
-            </a:r>
-            <a:endParaRPr lang="en-US" dirty="0">
+              <a:t>REMADE FOREVER</a:t>
+            </a:r>
+            <a:endParaRPr lang="en-US" sz="4200" dirty="0">
               <a:solidFill>
-                <a:schemeClr val="bg1"/>
+                <a:srgbClr val="6666FF"/>
               </a:solidFill>
               <a:latin typeface="Emulogic" pitchFamily="2" charset="0"/>
             </a:endParaRPr>
@@ -3187,6 +3194,9 @@
           <a:p>
             <a:r>
               <a:rPr lang="en-US" sz="1400" dirty="0" smtClean="0">
+                <a:solidFill>
+                  <a:srgbClr val="FF7C80"/>
+                </a:solidFill>
                 <a:latin typeface="Emulogic" pitchFamily="2" charset="0"/>
               </a:rPr>
               <a:t>Brandon goh nian zhou 				– 121309D</a:t>
@@ -3195,6 +3205,9 @@
           <a:p>
             <a:r>
               <a:rPr lang="en-US" sz="1400" dirty="0" smtClean="0">
+                <a:solidFill>
+                  <a:srgbClr val="FF7C80"/>
+                </a:solidFill>
                 <a:latin typeface="Emulogic" pitchFamily="2" charset="0"/>
               </a:rPr>
               <a:t>Kho liang hao 						– 121320s</a:t>
@@ -3203,6 +3216,9 @@
           <a:p>
             <a:r>
               <a:rPr lang="en-US" sz="1400" dirty="0" smtClean="0">
+                <a:solidFill>
+                  <a:srgbClr val="FF7C80"/>
+                </a:solidFill>
                 <a:latin typeface="Emulogic" pitchFamily="2" charset="0"/>
               </a:rPr>
               <a:t>Ron ng jian yian 					- 120160y</a:t>
@@ -3211,9 +3227,21 @@
           <a:p>
             <a:r>
               <a:rPr lang="en-US" sz="1400" dirty="0" smtClean="0">
+                <a:solidFill>
+                  <a:srgbClr val="FF7C80"/>
+                </a:solidFill>
                 <a:latin typeface="Emulogic" pitchFamily="2" charset="0"/>
               </a:rPr>
-              <a:t>Sim yuan he						- 12XXXXd</a:t>
+              <a:t>Sim yuan he						- </a:t>
+            </a:r>
+            <a:r>
+              <a:rPr lang="en-US" sz="1400" dirty="0" smtClean="0">
+                <a:solidFill>
+                  <a:srgbClr val="FF7C80"/>
+                </a:solidFill>
+                <a:latin typeface="Emulogic" pitchFamily="2" charset="0"/>
+              </a:rPr>
+              <a:t>122816d</a:t>
             </a:r>
           </a:p>
         </p:txBody>
@@ -3235,6 +3263,868 @@
       </p:par>
     </p:tnLst>
   </p:timing>
+</p:sld>
+</file>
+
+<file path=ppt/slides/slide2.xml><?xml version="1.0" encoding="utf-8"?>
+<p:sld xmlns:a="http://schemas.openxmlformats.org/drawingml/2006/main" xmlns:r="http://schemas.openxmlformats.org/officeDocument/2006/relationships" xmlns:p="http://schemas.openxmlformats.org/presentationml/2006/main">
+  <p:cSld>
+    <p:spTree>
+      <p:nvGrpSpPr>
+        <p:cNvPr id="1" name=""/>
+        <p:cNvGrpSpPr/>
+        <p:nvPr/>
+      </p:nvGrpSpPr>
+      <p:grpSpPr>
+        <a:xfrm>
+          <a:off x="0" y="0"/>
+          <a:ext cx="0" cy="0"/>
+          <a:chOff x="0" y="0"/>
+          <a:chExt cx="0" cy="0"/>
+        </a:xfrm>
+      </p:grpSpPr>
+      <p:pic>
+        <p:nvPicPr>
+          <p:cNvPr id="6" name="Picture 5"/>
+          <p:cNvPicPr>
+            <a:picLocks noChangeAspect="1"/>
+          </p:cNvPicPr>
+          <p:nvPr/>
+        </p:nvPicPr>
+        <p:blipFill>
+          <a:blip r:embed="rId2">
+            <a:extLst>
+              <a:ext uri="{28A0092B-C50C-407E-A947-70E740481C1C}">
+                <a14:useLocalDpi xmlns:a14="http://schemas.microsoft.com/office/drawing/2010/main" val="0"/>
+              </a:ext>
+            </a:extLst>
+          </a:blip>
+          <a:stretch>
+            <a:fillRect/>
+          </a:stretch>
+        </p:blipFill>
+        <p:spPr>
+          <a:xfrm>
+            <a:off x="-18203" y="0"/>
+            <a:ext cx="4582800" cy="6858000"/>
+          </a:xfrm>
+          <a:prstGeom prst="rect">
+            <a:avLst/>
+          </a:prstGeom>
+        </p:spPr>
+      </p:pic>
+      <p:pic>
+        <p:nvPicPr>
+          <p:cNvPr id="5" name="Picture 4"/>
+          <p:cNvPicPr>
+            <a:picLocks/>
+          </p:cNvPicPr>
+          <p:nvPr/>
+        </p:nvPicPr>
+        <p:blipFill>
+          <a:blip r:embed="rId3">
+            <a:extLst>
+              <a:ext uri="{28A0092B-C50C-407E-A947-70E740481C1C}">
+                <a14:useLocalDpi xmlns:a14="http://schemas.microsoft.com/office/drawing/2010/main" val="0"/>
+              </a:ext>
+            </a:extLst>
+          </a:blip>
+          <a:stretch>
+            <a:fillRect/>
+          </a:stretch>
+        </p:blipFill>
+        <p:spPr>
+          <a:xfrm>
+            <a:off x="4564597" y="3424896"/>
+            <a:ext cx="4582800" cy="3430800"/>
+          </a:xfrm>
+          <a:prstGeom prst="rect">
+            <a:avLst/>
+          </a:prstGeom>
+        </p:spPr>
+      </p:pic>
+      <p:pic>
+        <p:nvPicPr>
+          <p:cNvPr id="4" name="Content Placeholder 3"/>
+          <p:cNvPicPr>
+            <a:picLocks noGrp="1" noChangeAspect="1"/>
+          </p:cNvPicPr>
+          <p:nvPr>
+            <p:ph idx="1"/>
+          </p:nvPr>
+        </p:nvPicPr>
+        <p:blipFill>
+          <a:blip r:embed="rId4">
+            <a:extLst>
+              <a:ext uri="{28A0092B-C50C-407E-A947-70E740481C1C}">
+                <a14:useLocalDpi xmlns:a14="http://schemas.microsoft.com/office/drawing/2010/main" val="0"/>
+              </a:ext>
+            </a:extLst>
+          </a:blip>
+          <a:stretch>
+            <a:fillRect/>
+          </a:stretch>
+        </p:blipFill>
+        <p:spPr>
+          <a:xfrm>
+            <a:off x="4564597" y="1"/>
+            <a:ext cx="4579403" cy="3430798"/>
+          </a:xfrm>
+        </p:spPr>
+      </p:pic>
+      <p:sp>
+        <p:nvSpPr>
+          <p:cNvPr id="2" name="Title 1"/>
+          <p:cNvSpPr>
+            <a:spLocks noGrp="1"/>
+          </p:cNvSpPr>
+          <p:nvPr>
+            <p:ph type="title"/>
+          </p:nvPr>
+        </p:nvSpPr>
+        <p:spPr>
+          <a:xfrm>
+            <a:off x="-18203" y="0"/>
+            <a:ext cx="8229600" cy="1143000"/>
+          </a:xfrm>
+        </p:spPr>
+        <p:txBody>
+          <a:bodyPr/>
+          <a:lstStyle/>
+          <a:p>
+            <a:r>
+              <a:rPr lang="en-US" dirty="0" smtClean="0">
+                <a:solidFill>
+                  <a:schemeClr val="bg1"/>
+                </a:solidFill>
+                <a:latin typeface="Emulogic" pitchFamily="2" charset="0"/>
+              </a:rPr>
+              <a:t>Menu</a:t>
+            </a:r>
+            <a:r>
+              <a:rPr lang="en-US" dirty="0" smtClean="0">
+                <a:latin typeface="Emulogic" pitchFamily="2" charset="0"/>
+              </a:rPr>
+              <a:t> </a:t>
+            </a:r>
+            <a:r>
+              <a:rPr lang="en-US" dirty="0" smtClean="0">
+                <a:solidFill>
+                  <a:srgbClr val="FF0000"/>
+                </a:solidFill>
+                <a:latin typeface="Emulogic" pitchFamily="2" charset="0"/>
+              </a:rPr>
+              <a:t>UI</a:t>
+            </a:r>
+            <a:endParaRPr lang="en-US" dirty="0">
+              <a:solidFill>
+                <a:srgbClr val="FF0000"/>
+              </a:solidFill>
+              <a:latin typeface="Emulogic" pitchFamily="2" charset="0"/>
+            </a:endParaRPr>
+          </a:p>
+        </p:txBody>
+      </p:sp>
+      <p:sp>
+        <p:nvSpPr>
+          <p:cNvPr id="7" name="TextBox 6"/>
+          <p:cNvSpPr txBox="1"/>
+          <p:nvPr/>
+        </p:nvSpPr>
+        <p:spPr>
+          <a:xfrm>
+            <a:off x="27812" y="548680"/>
+            <a:ext cx="1663867" cy="1754326"/>
+          </a:xfrm>
+          <a:prstGeom prst="rect">
+            <a:avLst/>
+          </a:prstGeom>
+          <a:noFill/>
+        </p:spPr>
+        <p:txBody>
+          <a:bodyPr wrap="square" rtlCol="0">
+            <a:spAutoFit/>
+          </a:bodyPr>
+          <a:lstStyle/>
+          <a:p>
+            <a:r>
+              <a:rPr lang="en-US" dirty="0" smtClean="0">
+                <a:solidFill>
+                  <a:schemeClr val="bg1"/>
+                </a:solidFill>
+              </a:rPr>
+              <a:t>I wonder what is to be written here…</a:t>
+            </a:r>
+          </a:p>
+          <a:p>
+            <a:r>
+              <a:rPr lang="en-US" dirty="0" smtClean="0">
+                <a:solidFill>
+                  <a:schemeClr val="bg1"/>
+                </a:solidFill>
+              </a:rPr>
+              <a:t>Maybe someone can fill me in?</a:t>
+            </a:r>
+            <a:endParaRPr lang="en-US" dirty="0">
+              <a:solidFill>
+                <a:schemeClr val="bg1"/>
+              </a:solidFill>
+            </a:endParaRPr>
+          </a:p>
+        </p:txBody>
+      </p:sp>
+    </p:spTree>
+    <p:extLst>
+      <p:ext uri="{BB962C8B-B14F-4D97-AF65-F5344CB8AC3E}">
+        <p14:creationId xmlns:p14="http://schemas.microsoft.com/office/powerpoint/2010/main" val="2671960980"/>
+      </p:ext>
+    </p:extLst>
+  </p:cSld>
+  <p:clrMapOvr>
+    <a:masterClrMapping/>
+  </p:clrMapOvr>
+</p:sld>
+</file>
+
+<file path=ppt/slides/slide3.xml><?xml version="1.0" encoding="utf-8"?>
+<p:sld xmlns:a="http://schemas.openxmlformats.org/drawingml/2006/main" xmlns:r="http://schemas.openxmlformats.org/officeDocument/2006/relationships" xmlns:p="http://schemas.openxmlformats.org/presentationml/2006/main">
+  <p:cSld>
+    <p:spTree>
+      <p:nvGrpSpPr>
+        <p:cNvPr id="1" name=""/>
+        <p:cNvGrpSpPr/>
+        <p:nvPr/>
+      </p:nvGrpSpPr>
+      <p:grpSpPr>
+        <a:xfrm>
+          <a:off x="0" y="0"/>
+          <a:ext cx="0" cy="0"/>
+          <a:chOff x="0" y="0"/>
+          <a:chExt cx="0" cy="0"/>
+        </a:xfrm>
+      </p:grpSpPr>
+      <p:pic>
+        <p:nvPicPr>
+          <p:cNvPr id="8" name="Content Placeholder 3"/>
+          <p:cNvPicPr>
+            <a:picLocks/>
+          </p:cNvPicPr>
+          <p:nvPr/>
+        </p:nvPicPr>
+        <p:blipFill>
+          <a:blip r:embed="rId2">
+            <a:extLst>
+              <a:ext uri="{28A0092B-C50C-407E-A947-70E740481C1C}">
+                <a14:useLocalDpi xmlns:a14="http://schemas.microsoft.com/office/drawing/2010/main" val="0"/>
+              </a:ext>
+            </a:extLst>
+          </a:blip>
+          <a:stretch>
+            <a:fillRect/>
+          </a:stretch>
+        </p:blipFill>
+        <p:spPr>
+          <a:xfrm>
+            <a:off x="4564800" y="-5904"/>
+            <a:ext cx="4604400" cy="3430800"/>
+          </a:xfrm>
+          <a:prstGeom prst="rect">
+            <a:avLst/>
+          </a:prstGeom>
+        </p:spPr>
+      </p:pic>
+      <p:pic>
+        <p:nvPicPr>
+          <p:cNvPr id="9" name="Content Placeholder 3"/>
+          <p:cNvPicPr>
+            <a:picLocks/>
+          </p:cNvPicPr>
+          <p:nvPr/>
+        </p:nvPicPr>
+        <p:blipFill>
+          <a:blip r:embed="rId3">
+            <a:extLst>
+              <a:ext uri="{28A0092B-C50C-407E-A947-70E740481C1C}">
+                <a14:useLocalDpi xmlns:a14="http://schemas.microsoft.com/office/drawing/2010/main" val="0"/>
+              </a:ext>
+            </a:extLst>
+          </a:blip>
+          <a:stretch>
+            <a:fillRect/>
+          </a:stretch>
+        </p:blipFill>
+        <p:spPr>
+          <a:xfrm>
+            <a:off x="0" y="3427200"/>
+            <a:ext cx="4579200" cy="3430800"/>
+          </a:xfrm>
+          <a:prstGeom prst="rect">
+            <a:avLst/>
+          </a:prstGeom>
+        </p:spPr>
+      </p:pic>
+      <p:pic>
+        <p:nvPicPr>
+          <p:cNvPr id="10" name="Content Placeholder 3"/>
+          <p:cNvPicPr>
+            <a:picLocks/>
+          </p:cNvPicPr>
+          <p:nvPr/>
+        </p:nvPicPr>
+        <p:blipFill>
+          <a:blip r:embed="rId4">
+            <a:extLst>
+              <a:ext uri="{28A0092B-C50C-407E-A947-70E740481C1C}">
+                <a14:useLocalDpi xmlns:a14="http://schemas.microsoft.com/office/drawing/2010/main" val="0"/>
+              </a:ext>
+            </a:extLst>
+          </a:blip>
+          <a:stretch>
+            <a:fillRect/>
+          </a:stretch>
+        </p:blipFill>
+        <p:spPr>
+          <a:xfrm>
+            <a:off x="4589721" y="3427200"/>
+            <a:ext cx="4579200" cy="3430800"/>
+          </a:xfrm>
+          <a:prstGeom prst="rect">
+            <a:avLst/>
+          </a:prstGeom>
+        </p:spPr>
+      </p:pic>
+      <p:pic>
+        <p:nvPicPr>
+          <p:cNvPr id="4" name="Content Placeholder 3"/>
+          <p:cNvPicPr>
+            <a:picLocks noGrp="1"/>
+          </p:cNvPicPr>
+          <p:nvPr>
+            <p:ph idx="1"/>
+          </p:nvPr>
+        </p:nvPicPr>
+        <p:blipFill>
+          <a:blip r:embed="rId5">
+            <a:extLst>
+              <a:ext uri="{28A0092B-C50C-407E-A947-70E740481C1C}">
+                <a14:useLocalDpi xmlns:a14="http://schemas.microsoft.com/office/drawing/2010/main" val="0"/>
+              </a:ext>
+            </a:extLst>
+          </a:blip>
+          <a:stretch>
+            <a:fillRect/>
+          </a:stretch>
+        </p:blipFill>
+        <p:spPr>
+          <a:xfrm>
+            <a:off x="0" y="0"/>
+            <a:ext cx="4579200" cy="3430800"/>
+          </a:xfrm>
+        </p:spPr>
+      </p:pic>
+      <p:sp>
+        <p:nvSpPr>
+          <p:cNvPr id="2" name="Title 1"/>
+          <p:cNvSpPr>
+            <a:spLocks noGrp="1"/>
+          </p:cNvSpPr>
+          <p:nvPr>
+            <p:ph type="title"/>
+          </p:nvPr>
+        </p:nvSpPr>
+        <p:spPr>
+          <a:xfrm>
+            <a:off x="0" y="0"/>
+            <a:ext cx="8229600" cy="1143000"/>
+          </a:xfrm>
+        </p:spPr>
+        <p:txBody>
+          <a:bodyPr/>
+          <a:lstStyle/>
+          <a:p>
+            <a:r>
+              <a:rPr lang="en-US" dirty="0" smtClean="0">
+                <a:solidFill>
+                  <a:schemeClr val="bg1"/>
+                </a:solidFill>
+                <a:latin typeface="Emulogic" pitchFamily="2" charset="0"/>
+              </a:rPr>
+              <a:t>Gameplay</a:t>
+            </a:r>
+            <a:endParaRPr lang="en-US" dirty="0">
+              <a:solidFill>
+                <a:schemeClr val="bg1"/>
+              </a:solidFill>
+              <a:latin typeface="Emulogic" pitchFamily="2" charset="0"/>
+            </a:endParaRPr>
+          </a:p>
+        </p:txBody>
+      </p:sp>
+      <p:sp>
+        <p:nvSpPr>
+          <p:cNvPr id="11" name="TextBox 10"/>
+          <p:cNvSpPr txBox="1"/>
+          <p:nvPr/>
+        </p:nvSpPr>
+        <p:spPr>
+          <a:xfrm>
+            <a:off x="4680" y="1455167"/>
+            <a:ext cx="4824536" cy="923330"/>
+          </a:xfrm>
+          <a:prstGeom prst="rect">
+            <a:avLst/>
+          </a:prstGeom>
+          <a:noFill/>
+        </p:spPr>
+        <p:txBody>
+          <a:bodyPr wrap="square" rtlCol="0">
+            <a:spAutoFit/>
+          </a:bodyPr>
+          <a:lstStyle/>
+          <a:p>
+            <a:r>
+              <a:rPr lang="en-US" dirty="0" smtClean="0">
+                <a:solidFill>
+                  <a:schemeClr val="bg1"/>
+                </a:solidFill>
+              </a:rPr>
+              <a:t>Here’s where the fun part comes in</a:t>
+            </a:r>
+          </a:p>
+          <a:p>
+            <a:r>
+              <a:rPr lang="en-US" dirty="0" smtClean="0">
+                <a:solidFill>
+                  <a:schemeClr val="bg1"/>
+                </a:solidFill>
+              </a:rPr>
+              <a:t>Say stuff like particles, enemy ships, player ship, high score, asteroids, bullets, missiles</a:t>
+            </a:r>
+            <a:endParaRPr lang="en-US" dirty="0">
+              <a:solidFill>
+                <a:schemeClr val="bg1"/>
+              </a:solidFill>
+            </a:endParaRPr>
+          </a:p>
+        </p:txBody>
+      </p:sp>
+    </p:spTree>
+    <p:extLst>
+      <p:ext uri="{BB962C8B-B14F-4D97-AF65-F5344CB8AC3E}">
+        <p14:creationId xmlns:p14="http://schemas.microsoft.com/office/powerpoint/2010/main" val="3483373607"/>
+      </p:ext>
+    </p:extLst>
+  </p:cSld>
+  <p:clrMapOvr>
+    <a:masterClrMapping/>
+  </p:clrMapOvr>
+</p:sld>
+</file>
+
+<file path=ppt/slides/slide4.xml><?xml version="1.0" encoding="utf-8"?>
+<p:sld xmlns:a="http://schemas.openxmlformats.org/drawingml/2006/main" xmlns:r="http://schemas.openxmlformats.org/officeDocument/2006/relationships" xmlns:p="http://schemas.openxmlformats.org/presentationml/2006/main">
+  <p:cSld>
+    <p:spTree>
+      <p:nvGrpSpPr>
+        <p:cNvPr id="1" name=""/>
+        <p:cNvGrpSpPr/>
+        <p:nvPr/>
+      </p:nvGrpSpPr>
+      <p:grpSpPr>
+        <a:xfrm>
+          <a:off x="0" y="0"/>
+          <a:ext cx="0" cy="0"/>
+          <a:chOff x="0" y="0"/>
+          <a:chExt cx="0" cy="0"/>
+        </a:xfrm>
+      </p:grpSpPr>
+      <p:pic>
+        <p:nvPicPr>
+          <p:cNvPr id="4" name="Content Placeholder 3"/>
+          <p:cNvPicPr>
+            <a:picLocks noGrp="1"/>
+          </p:cNvPicPr>
+          <p:nvPr>
+            <p:ph idx="1"/>
+          </p:nvPr>
+        </p:nvPicPr>
+        <p:blipFill>
+          <a:blip r:embed="rId2">
+            <a:extLst>
+              <a:ext uri="{28A0092B-C50C-407E-A947-70E740481C1C}">
+                <a14:useLocalDpi xmlns:a14="http://schemas.microsoft.com/office/drawing/2010/main" val="0"/>
+              </a:ext>
+            </a:extLst>
+          </a:blip>
+          <a:stretch>
+            <a:fillRect/>
+          </a:stretch>
+        </p:blipFill>
+        <p:spPr>
+          <a:xfrm>
+            <a:off x="-1" y="-357"/>
+            <a:ext cx="9144001" cy="6858357"/>
+          </a:xfrm>
+        </p:spPr>
+      </p:pic>
+      <p:sp>
+        <p:nvSpPr>
+          <p:cNvPr id="2" name="Title 1"/>
+          <p:cNvSpPr>
+            <a:spLocks noGrp="1"/>
+          </p:cNvSpPr>
+          <p:nvPr>
+            <p:ph type="title"/>
+          </p:nvPr>
+        </p:nvSpPr>
+        <p:spPr>
+          <a:xfrm>
+            <a:off x="0" y="0"/>
+            <a:ext cx="7812360" cy="1196752"/>
+          </a:xfrm>
+        </p:spPr>
+        <p:txBody>
+          <a:bodyPr/>
+          <a:lstStyle/>
+          <a:p>
+            <a:r>
+              <a:rPr lang="en-US" dirty="0" smtClean="0">
+                <a:solidFill>
+                  <a:srgbClr val="FF0000"/>
+                </a:solidFill>
+                <a:latin typeface="Emulogic" pitchFamily="2" charset="0"/>
+              </a:rPr>
+              <a:t>G</a:t>
+            </a:r>
+            <a:r>
+              <a:rPr lang="en-US" dirty="0" smtClean="0">
+                <a:solidFill>
+                  <a:srgbClr val="FFC000"/>
+                </a:solidFill>
+                <a:latin typeface="Emulogic" pitchFamily="2" charset="0"/>
+              </a:rPr>
+              <a:t>a</a:t>
+            </a:r>
+            <a:r>
+              <a:rPr lang="en-US" dirty="0" smtClean="0">
+                <a:solidFill>
+                  <a:srgbClr val="FFFF00"/>
+                </a:solidFill>
+                <a:latin typeface="Emulogic" pitchFamily="2" charset="0"/>
+              </a:rPr>
+              <a:t>m</a:t>
+            </a:r>
+            <a:r>
+              <a:rPr lang="en-US" dirty="0" smtClean="0">
+                <a:solidFill>
+                  <a:srgbClr val="92D050"/>
+                </a:solidFill>
+                <a:latin typeface="Emulogic" pitchFamily="2" charset="0"/>
+              </a:rPr>
+              <a:t>e</a:t>
+            </a:r>
+            <a:r>
+              <a:rPr lang="en-US" dirty="0" smtClean="0">
+                <a:latin typeface="Emulogic" pitchFamily="2" charset="0"/>
+              </a:rPr>
+              <a:t> </a:t>
+            </a:r>
+            <a:r>
+              <a:rPr lang="en-US" dirty="0" smtClean="0">
+                <a:solidFill>
+                  <a:srgbClr val="00B050"/>
+                </a:solidFill>
+                <a:latin typeface="Emulogic" pitchFamily="2" charset="0"/>
+              </a:rPr>
+              <a:t>o</a:t>
+            </a:r>
+            <a:r>
+              <a:rPr lang="en-US" dirty="0" smtClean="0">
+                <a:solidFill>
+                  <a:srgbClr val="00B0F0"/>
+                </a:solidFill>
+                <a:latin typeface="Emulogic" pitchFamily="2" charset="0"/>
+              </a:rPr>
+              <a:t>v</a:t>
+            </a:r>
+            <a:r>
+              <a:rPr lang="en-US" dirty="0" smtClean="0">
+                <a:solidFill>
+                  <a:srgbClr val="0070C0"/>
+                </a:solidFill>
+                <a:latin typeface="Emulogic" pitchFamily="2" charset="0"/>
+              </a:rPr>
+              <a:t>e</a:t>
+            </a:r>
+            <a:r>
+              <a:rPr lang="en-US" dirty="0" smtClean="0">
+                <a:solidFill>
+                  <a:srgbClr val="7030A0"/>
+                </a:solidFill>
+                <a:latin typeface="Emulogic" pitchFamily="2" charset="0"/>
+              </a:rPr>
+              <a:t>r</a:t>
+            </a:r>
+            <a:endParaRPr lang="en-US" dirty="0">
+              <a:solidFill>
+                <a:srgbClr val="7030A0"/>
+              </a:solidFill>
+              <a:latin typeface="Emulogic" pitchFamily="2" charset="0"/>
+            </a:endParaRPr>
+          </a:p>
+        </p:txBody>
+      </p:sp>
+      <p:sp>
+        <p:nvSpPr>
+          <p:cNvPr id="5" name="TextBox 4"/>
+          <p:cNvSpPr txBox="1"/>
+          <p:nvPr/>
+        </p:nvSpPr>
+        <p:spPr>
+          <a:xfrm>
+            <a:off x="-643" y="5946656"/>
+            <a:ext cx="3024336" cy="923330"/>
+          </a:xfrm>
+          <a:prstGeom prst="rect">
+            <a:avLst/>
+          </a:prstGeom>
+          <a:noFill/>
+        </p:spPr>
+        <p:txBody>
+          <a:bodyPr wrap="square" rtlCol="0">
+            <a:spAutoFit/>
+          </a:bodyPr>
+          <a:lstStyle/>
+          <a:p>
+            <a:r>
+              <a:rPr lang="en-US" dirty="0" smtClean="0">
+                <a:solidFill>
+                  <a:schemeClr val="bg1"/>
+                </a:solidFill>
+              </a:rPr>
+              <a:t>I’m guessing what’s going to happen here is that when the player ship gets hit, YOLO.</a:t>
+            </a:r>
+            <a:endParaRPr lang="en-US" dirty="0">
+              <a:solidFill>
+                <a:schemeClr val="bg1"/>
+              </a:solidFill>
+            </a:endParaRPr>
+          </a:p>
+        </p:txBody>
+      </p:sp>
+    </p:spTree>
+    <p:extLst>
+      <p:ext uri="{BB962C8B-B14F-4D97-AF65-F5344CB8AC3E}">
+        <p14:creationId xmlns:p14="http://schemas.microsoft.com/office/powerpoint/2010/main" val="2720615117"/>
+      </p:ext>
+    </p:extLst>
+  </p:cSld>
+  <p:clrMapOvr>
+    <a:masterClrMapping/>
+  </p:clrMapOvr>
+</p:sld>
+</file>
+
+<file path=ppt/slides/slide5.xml><?xml version="1.0" encoding="utf-8"?>
+<p:sld xmlns:a="http://schemas.openxmlformats.org/drawingml/2006/main" xmlns:r="http://schemas.openxmlformats.org/officeDocument/2006/relationships" xmlns:p="http://schemas.openxmlformats.org/presentationml/2006/main">
+  <p:cSld>
+    <p:spTree>
+      <p:nvGrpSpPr>
+        <p:cNvPr id="1" name=""/>
+        <p:cNvGrpSpPr/>
+        <p:nvPr/>
+      </p:nvGrpSpPr>
+      <p:grpSpPr>
+        <a:xfrm>
+          <a:off x="0" y="0"/>
+          <a:ext cx="0" cy="0"/>
+          <a:chOff x="0" y="0"/>
+          <a:chExt cx="0" cy="0"/>
+        </a:xfrm>
+      </p:grpSpPr>
+      <p:pic>
+        <p:nvPicPr>
+          <p:cNvPr id="4" name="Content Placeholder 3"/>
+          <p:cNvPicPr>
+            <a:picLocks noGrp="1"/>
+          </p:cNvPicPr>
+          <p:nvPr>
+            <p:ph idx="1"/>
+          </p:nvPr>
+        </p:nvPicPr>
+        <p:blipFill>
+          <a:blip r:embed="rId2">
+            <a:extLst>
+              <a:ext uri="{28A0092B-C50C-407E-A947-70E740481C1C}">
+                <a14:useLocalDpi xmlns:a14="http://schemas.microsoft.com/office/drawing/2010/main" val="0"/>
+              </a:ext>
+            </a:extLst>
+          </a:blip>
+          <a:stretch>
+            <a:fillRect/>
+          </a:stretch>
+        </p:blipFill>
+        <p:spPr>
+          <a:xfrm>
+            <a:off x="0" y="0"/>
+            <a:ext cx="9144000" cy="6858000"/>
+          </a:xfrm>
+        </p:spPr>
+      </p:pic>
+      <p:sp>
+        <p:nvSpPr>
+          <p:cNvPr id="2" name="Title 1"/>
+          <p:cNvSpPr>
+            <a:spLocks noGrp="1"/>
+          </p:cNvSpPr>
+          <p:nvPr>
+            <p:ph type="title"/>
+          </p:nvPr>
+        </p:nvSpPr>
+        <p:spPr>
+          <a:xfrm>
+            <a:off x="0" y="-12307"/>
+            <a:ext cx="8229600" cy="1143000"/>
+          </a:xfrm>
+        </p:spPr>
+        <p:txBody>
+          <a:bodyPr/>
+          <a:lstStyle/>
+          <a:p>
+            <a:r>
+              <a:rPr lang="en-US" dirty="0" smtClean="0">
+                <a:solidFill>
+                  <a:schemeClr val="bg1"/>
+                </a:solidFill>
+                <a:latin typeface="Emulogic" pitchFamily="2" charset="0"/>
+              </a:rPr>
+              <a:t>SHOP UPGRADE</a:t>
+            </a:r>
+            <a:endParaRPr lang="en-US" dirty="0">
+              <a:solidFill>
+                <a:schemeClr val="bg1"/>
+              </a:solidFill>
+              <a:latin typeface="Emulogic" pitchFamily="2" charset="0"/>
+            </a:endParaRPr>
+          </a:p>
+        </p:txBody>
+      </p:sp>
+      <p:sp>
+        <p:nvSpPr>
+          <p:cNvPr id="5" name="TextBox 4"/>
+          <p:cNvSpPr txBox="1"/>
+          <p:nvPr/>
+        </p:nvSpPr>
+        <p:spPr>
+          <a:xfrm>
+            <a:off x="5466" y="1403484"/>
+            <a:ext cx="2262277" cy="923330"/>
+          </a:xfrm>
+          <a:prstGeom prst="rect">
+            <a:avLst/>
+          </a:prstGeom>
+          <a:noFill/>
+        </p:spPr>
+        <p:txBody>
+          <a:bodyPr wrap="square" rtlCol="0">
+            <a:spAutoFit/>
+          </a:bodyPr>
+          <a:lstStyle/>
+          <a:p>
+            <a:r>
+              <a:rPr lang="en-US" dirty="0" smtClean="0">
+                <a:solidFill>
+                  <a:schemeClr val="bg1"/>
+                </a:solidFill>
+              </a:rPr>
+              <a:t>Well the upgrades are purchasable after each game so . . .</a:t>
+            </a:r>
+            <a:endParaRPr lang="en-US" dirty="0">
+              <a:solidFill>
+                <a:schemeClr val="bg1"/>
+              </a:solidFill>
+            </a:endParaRPr>
+          </a:p>
+        </p:txBody>
+      </p:sp>
+    </p:spTree>
+    <p:extLst>
+      <p:ext uri="{BB962C8B-B14F-4D97-AF65-F5344CB8AC3E}">
+        <p14:creationId xmlns:p14="http://schemas.microsoft.com/office/powerpoint/2010/main" val="1074244938"/>
+      </p:ext>
+    </p:extLst>
+  </p:cSld>
+  <p:clrMapOvr>
+    <a:masterClrMapping/>
+  </p:clrMapOvr>
+</p:sld>
+</file>
+
+<file path=ppt/slides/slide6.xml><?xml version="1.0" encoding="utf-8"?>
+<p:sld xmlns:a="http://schemas.openxmlformats.org/drawingml/2006/main" xmlns:r="http://schemas.openxmlformats.org/officeDocument/2006/relationships" xmlns:p="http://schemas.openxmlformats.org/presentationml/2006/main">
+  <p:cSld>
+    <p:spTree>
+      <p:nvGrpSpPr>
+        <p:cNvPr id="1" name=""/>
+        <p:cNvGrpSpPr/>
+        <p:nvPr/>
+      </p:nvGrpSpPr>
+      <p:grpSpPr>
+        <a:xfrm>
+          <a:off x="0" y="0"/>
+          <a:ext cx="0" cy="0"/>
+          <a:chOff x="0" y="0"/>
+          <a:chExt cx="0" cy="0"/>
+        </a:xfrm>
+      </p:grpSpPr>
+      <p:sp>
+        <p:nvSpPr>
+          <p:cNvPr id="2" name="Title 1"/>
+          <p:cNvSpPr>
+            <a:spLocks noGrp="1"/>
+          </p:cNvSpPr>
+          <p:nvPr>
+            <p:ph type="title"/>
+          </p:nvPr>
+        </p:nvSpPr>
+        <p:spPr/>
+        <p:txBody>
+          <a:bodyPr/>
+          <a:lstStyle/>
+          <a:p>
+            <a:endParaRPr lang="en-US" dirty="0"/>
+          </a:p>
+        </p:txBody>
+      </p:sp>
+      <p:sp>
+        <p:nvSpPr>
+          <p:cNvPr id="3" name="Content Placeholder 2"/>
+          <p:cNvSpPr>
+            <a:spLocks noGrp="1"/>
+          </p:cNvSpPr>
+          <p:nvPr>
+            <p:ph idx="1"/>
+          </p:nvPr>
+        </p:nvSpPr>
+        <p:spPr/>
+        <p:txBody>
+          <a:bodyPr/>
+          <a:lstStyle/>
+          <a:p>
+            <a:endParaRPr lang="en-US"/>
+          </a:p>
+        </p:txBody>
+      </p:sp>
+    </p:spTree>
+    <p:extLst>
+      <p:ext uri="{BB962C8B-B14F-4D97-AF65-F5344CB8AC3E}">
+        <p14:creationId xmlns:p14="http://schemas.microsoft.com/office/powerpoint/2010/main" val="576905808"/>
+      </p:ext>
+    </p:extLst>
+  </p:cSld>
+  <p:clrMapOvr>
+    <a:masterClrMapping/>
+  </p:clrMapOvr>
 </p:sld>
 </file>
 

</xml_diff>